<commit_message>
add stashed changes + add manual target detection
</commit_message>
<xml_diff>
--- a/additive_noise_process.pptx
+++ b/additive_noise_process.pptx
@@ -272,7 +272,7 @@
           <a:p>
             <a:fld id="{E44AB813-0EA2-46EB-AEB0-C46211B6B611}" type="datetimeFigureOut">
               <a:rPr lang="en-IL" smtClean="0"/>
-              <a:t>19/01/2023</a:t>
+              <a:t>09/04/2023</a:t>
             </a:fld>
             <a:endParaRPr lang="en-IL"/>
           </a:p>
@@ -472,7 +472,7 @@
           <a:p>
             <a:fld id="{E44AB813-0EA2-46EB-AEB0-C46211B6B611}" type="datetimeFigureOut">
               <a:rPr lang="en-IL" smtClean="0"/>
-              <a:t>19/01/2023</a:t>
+              <a:t>09/04/2023</a:t>
             </a:fld>
             <a:endParaRPr lang="en-IL"/>
           </a:p>
@@ -682,7 +682,7 @@
           <a:p>
             <a:fld id="{E44AB813-0EA2-46EB-AEB0-C46211B6B611}" type="datetimeFigureOut">
               <a:rPr lang="en-IL" smtClean="0"/>
-              <a:t>19/01/2023</a:t>
+              <a:t>09/04/2023</a:t>
             </a:fld>
             <a:endParaRPr lang="en-IL"/>
           </a:p>
@@ -882,7 +882,7 @@
           <a:p>
             <a:fld id="{E44AB813-0EA2-46EB-AEB0-C46211B6B611}" type="datetimeFigureOut">
               <a:rPr lang="en-IL" smtClean="0"/>
-              <a:t>19/01/2023</a:t>
+              <a:t>09/04/2023</a:t>
             </a:fld>
             <a:endParaRPr lang="en-IL"/>
           </a:p>
@@ -1158,7 +1158,7 @@
           <a:p>
             <a:fld id="{E44AB813-0EA2-46EB-AEB0-C46211B6B611}" type="datetimeFigureOut">
               <a:rPr lang="en-IL" smtClean="0"/>
-              <a:t>19/01/2023</a:t>
+              <a:t>09/04/2023</a:t>
             </a:fld>
             <a:endParaRPr lang="en-IL"/>
           </a:p>
@@ -1426,7 +1426,7 @@
           <a:p>
             <a:fld id="{E44AB813-0EA2-46EB-AEB0-C46211B6B611}" type="datetimeFigureOut">
               <a:rPr lang="en-IL" smtClean="0"/>
-              <a:t>19/01/2023</a:t>
+              <a:t>09/04/2023</a:t>
             </a:fld>
             <a:endParaRPr lang="en-IL"/>
           </a:p>
@@ -1841,7 +1841,7 @@
           <a:p>
             <a:fld id="{E44AB813-0EA2-46EB-AEB0-C46211B6B611}" type="datetimeFigureOut">
               <a:rPr lang="en-IL" smtClean="0"/>
-              <a:t>19/01/2023</a:t>
+              <a:t>09/04/2023</a:t>
             </a:fld>
             <a:endParaRPr lang="en-IL"/>
           </a:p>
@@ -1983,7 +1983,7 @@
           <a:p>
             <a:fld id="{E44AB813-0EA2-46EB-AEB0-C46211B6B611}" type="datetimeFigureOut">
               <a:rPr lang="en-IL" smtClean="0"/>
-              <a:t>19/01/2023</a:t>
+              <a:t>09/04/2023</a:t>
             </a:fld>
             <a:endParaRPr lang="en-IL"/>
           </a:p>
@@ -2096,7 +2096,7 @@
           <a:p>
             <a:fld id="{E44AB813-0EA2-46EB-AEB0-C46211B6B611}" type="datetimeFigureOut">
               <a:rPr lang="en-IL" smtClean="0"/>
-              <a:t>19/01/2023</a:t>
+              <a:t>09/04/2023</a:t>
             </a:fld>
             <a:endParaRPr lang="en-IL"/>
           </a:p>
@@ -2409,7 +2409,7 @@
           <a:p>
             <a:fld id="{E44AB813-0EA2-46EB-AEB0-C46211B6B611}" type="datetimeFigureOut">
               <a:rPr lang="en-IL" smtClean="0"/>
-              <a:t>19/01/2023</a:t>
+              <a:t>09/04/2023</a:t>
             </a:fld>
             <a:endParaRPr lang="en-IL"/>
           </a:p>
@@ -2698,7 +2698,7 @@
           <a:p>
             <a:fld id="{E44AB813-0EA2-46EB-AEB0-C46211B6B611}" type="datetimeFigureOut">
               <a:rPr lang="en-IL" smtClean="0"/>
-              <a:t>19/01/2023</a:t>
+              <a:t>09/04/2023</a:t>
             </a:fld>
             <a:endParaRPr lang="en-IL"/>
           </a:p>
@@ -2941,7 +2941,7 @@
           <a:p>
             <a:fld id="{E44AB813-0EA2-46EB-AEB0-C46211B6B611}" type="datetimeFigureOut">
               <a:rPr lang="en-IL" smtClean="0"/>
-              <a:t>19/01/2023</a:t>
+              <a:t>09/04/2023</a:t>
             </a:fld>
             <a:endParaRPr lang="en-IL"/>
           </a:p>
@@ -3682,8 +3682,8 @@
           </a:p>
         </p:txBody>
       </p:sp>
-      <mc:AlternateContent xmlns:mc="http://schemas.openxmlformats.org/markup-compatibility/2006">
-        <mc:Choice xmlns:a14="http://schemas.microsoft.com/office/drawing/2010/main" Requires="a14">
+      <mc:AlternateContent xmlns:mc="http://schemas.openxmlformats.org/markup-compatibility/2006" xmlns:a14="http://schemas.microsoft.com/office/drawing/2010/main">
+        <mc:Choice Requires="a14">
           <p:sp>
             <p:nvSpPr>
               <p:cNvPr id="12" name="Rectangle 11">
@@ -3802,7 +3802,7 @@
             </p:txBody>
           </p:sp>
         </mc:Choice>
-        <mc:Fallback>
+        <mc:Fallback xmlns="">
           <p:sp>
             <p:nvSpPr>
               <p:cNvPr id="12" name="Rectangle 11">
@@ -3847,8 +3847,8 @@
           </p:sp>
         </mc:Fallback>
       </mc:AlternateContent>
-      <mc:AlternateContent xmlns:mc="http://schemas.openxmlformats.org/markup-compatibility/2006">
-        <mc:Choice xmlns:a14="http://schemas.microsoft.com/office/drawing/2010/main" Requires="a14">
+      <mc:AlternateContent xmlns:mc="http://schemas.openxmlformats.org/markup-compatibility/2006" xmlns:a14="http://schemas.microsoft.com/office/drawing/2010/main">
+        <mc:Choice Requires="a14">
           <p:sp>
             <p:nvSpPr>
               <p:cNvPr id="13" name="Rectangle 12">
@@ -3951,7 +3951,7 @@
             </p:txBody>
           </p:sp>
         </mc:Choice>
-        <mc:Fallback>
+        <mc:Fallback xmlns="">
           <p:sp>
             <p:nvSpPr>
               <p:cNvPr id="13" name="Rectangle 12">
@@ -4157,8 +4157,8 @@
           </a:p>
         </p:txBody>
       </p:sp>
-      <mc:AlternateContent xmlns:mc="http://schemas.openxmlformats.org/markup-compatibility/2006">
-        <mc:Choice xmlns:a14="http://schemas.microsoft.com/office/drawing/2010/main" Requires="a14">
+      <mc:AlternateContent xmlns:mc="http://schemas.openxmlformats.org/markup-compatibility/2006" xmlns:a14="http://schemas.microsoft.com/office/drawing/2010/main">
+        <mc:Choice Requires="a14">
           <p:sp>
             <p:nvSpPr>
               <p:cNvPr id="26" name="Rectangle 25">
@@ -4261,7 +4261,7 @@
             </p:txBody>
           </p:sp>
         </mc:Choice>
-        <mc:Fallback>
+        <mc:Fallback xmlns="">
           <p:sp>
             <p:nvSpPr>
               <p:cNvPr id="26" name="Rectangle 25">
@@ -4306,8 +4306,8 @@
           </p:sp>
         </mc:Fallback>
       </mc:AlternateContent>
-      <mc:AlternateContent xmlns:mc="http://schemas.openxmlformats.org/markup-compatibility/2006">
-        <mc:Choice xmlns:a14="http://schemas.microsoft.com/office/drawing/2010/main" Requires="a14">
+      <mc:AlternateContent xmlns:mc="http://schemas.openxmlformats.org/markup-compatibility/2006" xmlns:a14="http://schemas.microsoft.com/office/drawing/2010/main">
+        <mc:Choice Requires="a14">
           <p:sp>
             <p:nvSpPr>
               <p:cNvPr id="28" name="Rectangle 27">
@@ -4410,7 +4410,7 @@
             </p:txBody>
           </p:sp>
         </mc:Choice>
-        <mc:Fallback>
+        <mc:Fallback xmlns="">
           <p:sp>
             <p:nvSpPr>
               <p:cNvPr id="28" name="Rectangle 27">
@@ -4498,8 +4498,8 @@
           </a:fontRef>
         </p:style>
       </p:cxnSp>
-      <mc:AlternateContent xmlns:mc="http://schemas.openxmlformats.org/markup-compatibility/2006">
-        <mc:Choice xmlns:a14="http://schemas.microsoft.com/office/drawing/2010/main" Requires="a14">
+      <mc:AlternateContent xmlns:mc="http://schemas.openxmlformats.org/markup-compatibility/2006" xmlns:a14="http://schemas.microsoft.com/office/drawing/2010/main">
+        <mc:Choice Requires="a14">
           <p:sp>
             <p:nvSpPr>
               <p:cNvPr id="30" name="TextBox 29">
@@ -4654,7 +4654,7 @@
             </p:txBody>
           </p:sp>
         </mc:Choice>
-        <mc:Fallback>
+        <mc:Fallback xmlns="">
           <p:sp>
             <p:nvSpPr>
               <p:cNvPr id="30" name="TextBox 29">
@@ -4833,8 +4833,8 @@
           </a:fontRef>
         </p:style>
       </p:cxnSp>
-      <mc:AlternateContent xmlns:mc="http://schemas.openxmlformats.org/markup-compatibility/2006">
-        <mc:Choice xmlns:a14="http://schemas.microsoft.com/office/drawing/2010/main" Requires="a14">
+      <mc:AlternateContent xmlns:mc="http://schemas.openxmlformats.org/markup-compatibility/2006" xmlns:a14="http://schemas.microsoft.com/office/drawing/2010/main">
+        <mc:Choice Requires="a14">
           <p:sp>
             <p:nvSpPr>
               <p:cNvPr id="40" name="TextBox 39">
@@ -4934,7 +4934,7 @@
             </p:txBody>
           </p:sp>
         </mc:Choice>
-        <mc:Fallback>
+        <mc:Fallback xmlns="">
           <p:sp>
             <p:nvSpPr>
               <p:cNvPr id="40" name="TextBox 39">
@@ -5218,8 +5218,8 @@
           </a:fontRef>
         </p:style>
       </p:cxnSp>
-      <mc:AlternateContent xmlns:mc="http://schemas.openxmlformats.org/markup-compatibility/2006">
-        <mc:Choice xmlns:a14="http://schemas.microsoft.com/office/drawing/2010/main" Requires="a14">
+      <mc:AlternateContent xmlns:mc="http://schemas.openxmlformats.org/markup-compatibility/2006" xmlns:a14="http://schemas.microsoft.com/office/drawing/2010/main">
+        <mc:Choice Requires="a14">
           <p:sp>
             <p:nvSpPr>
               <p:cNvPr id="49" name="Rectangle 48">
@@ -5322,7 +5322,7 @@
             </p:txBody>
           </p:sp>
         </mc:Choice>
-        <mc:Fallback>
+        <mc:Fallback xmlns="">
           <p:sp>
             <p:nvSpPr>
               <p:cNvPr id="49" name="Rectangle 48">
@@ -5367,8 +5367,8 @@
           </p:sp>
         </mc:Fallback>
       </mc:AlternateContent>
-      <mc:AlternateContent xmlns:mc="http://schemas.openxmlformats.org/markup-compatibility/2006">
-        <mc:Choice xmlns:a14="http://schemas.microsoft.com/office/drawing/2010/main" Requires="a14">
+      <mc:AlternateContent xmlns:mc="http://schemas.openxmlformats.org/markup-compatibility/2006" xmlns:a14="http://schemas.microsoft.com/office/drawing/2010/main">
+        <mc:Choice Requires="a14">
           <p:sp>
             <p:nvSpPr>
               <p:cNvPr id="55" name="Rectangle 54">
@@ -5471,7 +5471,7 @@
             </p:txBody>
           </p:sp>
         </mc:Choice>
-        <mc:Fallback>
+        <mc:Fallback xmlns="">
           <p:sp>
             <p:nvSpPr>
               <p:cNvPr id="55" name="Rectangle 54">

</xml_diff>